<commit_message>
Minor Updates for the presentation
</commit_message>
<xml_diff>
--- a/MachineLearningProjectPowerpoint.pptx
+++ b/MachineLearningProjectPowerpoint.pptx
@@ -5,7 +5,7 @@
     <p:sldMasterId id="2147483648" r:id="rId1"/>
   </p:sldMasterIdLst>
   <p:notesMasterIdLst>
-    <p:notesMasterId r:id="rId25"/>
+    <p:notesMasterId r:id="rId26"/>
   </p:notesMasterIdLst>
   <p:sldIdLst>
     <p:sldId id="256" r:id="rId2"/>
@@ -28,9 +28,10 @@
     <p:sldId id="274" r:id="rId19"/>
     <p:sldId id="275" r:id="rId20"/>
     <p:sldId id="277" r:id="rId21"/>
-    <p:sldId id="278" r:id="rId22"/>
-    <p:sldId id="279" r:id="rId23"/>
-    <p:sldId id="280" r:id="rId24"/>
+    <p:sldId id="281" r:id="rId22"/>
+    <p:sldId id="278" r:id="rId23"/>
+    <p:sldId id="279" r:id="rId24"/>
+    <p:sldId id="280" r:id="rId25"/>
   </p:sldIdLst>
   <p:sldSz cx="9144000" cy="5143500" type="screen16x9"/>
   <p:notesSz cx="6858000" cy="9144000"/>
@@ -230,7 +231,7 @@
           <a:p>
             <a:fld id="{C8D18E60-4300-4729-A0D7-6AB984C3922D}" type="datetimeFigureOut">
               <a:rPr lang="en-US" smtClean="0"/>
-              <a:t>2/14/23</a:t>
+              <a:t>2/15/23</a:t>
             </a:fld>
             <a:endParaRPr lang="en-US"/>
           </a:p>
@@ -834,7 +835,7 @@
           <a:p>
             <a:fld id="{87350B06-B074-48FC-8CFD-53D2CD8FB95F}" type="slidenum">
               <a:rPr lang="en-US" smtClean="0"/>
-              <a:t>21</a:t>
+              <a:t>22</a:t>
             </a:fld>
             <a:endParaRPr lang="en-US"/>
           </a:p>
@@ -923,7 +924,7 @@
           <a:p>
             <a:fld id="{87350B06-B074-48FC-8CFD-53D2CD8FB95F}" type="slidenum">
               <a:rPr lang="en-US" smtClean="0"/>
-              <a:t>22</a:t>
+              <a:t>23</a:t>
             </a:fld>
             <a:endParaRPr lang="en-US"/>
           </a:p>
@@ -1872,7 +1873,7 @@
           <a:p>
             <a:fld id="{DA099259-7646-A64D-B5BC-452026AE3FE7}" type="datetime1">
               <a:rPr lang="en-US" smtClean="0"/>
-              <a:t>2/14/23</a:t>
+              <a:t>2/15/23</a:t>
             </a:fld>
             <a:endParaRPr lang="en-US"/>
           </a:p>
@@ -2125,7 +2126,7 @@
           <a:p>
             <a:fld id="{96C096B7-E23E-A046-8C0C-C72F711E8E6F}" type="datetime1">
               <a:rPr lang="en-US" smtClean="0"/>
-              <a:t>2/14/23</a:t>
+              <a:t>2/15/23</a:t>
             </a:fld>
             <a:endParaRPr lang="en-US"/>
           </a:p>
@@ -2294,7 +2295,7 @@
           <a:p>
             <a:fld id="{1814CE0A-4E5B-CA46-BB9E-9327319BA9C6}" type="datetime1">
               <a:rPr lang="en-US" smtClean="0"/>
-              <a:t>2/14/23</a:t>
+              <a:t>2/15/23</a:t>
             </a:fld>
             <a:endParaRPr lang="en-US"/>
           </a:p>
@@ -2473,7 +2474,7 @@
           <a:p>
             <a:fld id="{59ACA410-A9A6-FC46-B506-06B5C37014D9}" type="datetime1">
               <a:rPr lang="en-US" smtClean="0"/>
-              <a:t>2/14/23</a:t>
+              <a:t>2/15/23</a:t>
             </a:fld>
             <a:endParaRPr lang="en-US"/>
           </a:p>
@@ -2769,7 +2770,7 @@
           <a:p>
             <a:fld id="{4F50BF37-B650-0744-B538-DE5C5686BAD5}" type="datetime1">
               <a:rPr lang="en-US" smtClean="0"/>
-              <a:t>2/14/23</a:t>
+              <a:t>2/15/23</a:t>
             </a:fld>
             <a:endParaRPr lang="en-US"/>
           </a:p>
@@ -3016,7 +3017,7 @@
           <a:p>
             <a:fld id="{CC8DAFC0-4845-2D40-B970-7E21CEA8AB89}" type="datetime1">
               <a:rPr lang="en-US" smtClean="0"/>
-              <a:t>2/14/23</a:t>
+              <a:t>2/15/23</a:t>
             </a:fld>
             <a:endParaRPr lang="en-US"/>
           </a:p>
@@ -3262,7 +3263,7 @@
           <a:p>
             <a:fld id="{FEE4AEEE-D646-0A48-A29F-6FCB894C6BD6}" type="datetime1">
               <a:rPr lang="en-US" smtClean="0"/>
-              <a:t>2/14/23</a:t>
+              <a:t>2/15/23</a:t>
             </a:fld>
             <a:endParaRPr lang="en-US"/>
           </a:p>
@@ -3548,7 +3549,7 @@
           <a:p>
             <a:fld id="{48C25089-8CD1-4C4D-8606-DB261A8B38AC}" type="datetime1">
               <a:rPr lang="en-US" smtClean="0"/>
-              <a:t>2/14/23</a:t>
+              <a:t>2/15/23</a:t>
             </a:fld>
             <a:endParaRPr lang="en-US"/>
           </a:p>
@@ -4034,7 +4035,7 @@
           <a:p>
             <a:fld id="{8AEB42CD-82DD-6B4B-8C76-2380146719EB}" type="datetime1">
               <a:rPr lang="en-US" smtClean="0"/>
-              <a:t>2/14/23</a:t>
+              <a:t>2/15/23</a:t>
             </a:fld>
             <a:endParaRPr lang="en-US"/>
           </a:p>
@@ -4152,7 +4153,7 @@
           <a:p>
             <a:fld id="{048AE317-6E30-324D-9D40-64B99D62D9DB}" type="datetime1">
               <a:rPr lang="en-US" smtClean="0"/>
-              <a:t>2/14/23</a:t>
+              <a:t>2/15/23</a:t>
             </a:fld>
             <a:endParaRPr lang="en-US"/>
           </a:p>
@@ -4248,7 +4249,7 @@
           <a:p>
             <a:fld id="{80B34F09-1E95-B447-98C9-159BC06CD423}" type="datetime1">
               <a:rPr lang="en-US" smtClean="0"/>
-              <a:t>2/14/23</a:t>
+              <a:t>2/15/23</a:t>
             </a:fld>
             <a:endParaRPr lang="en-US"/>
           </a:p>
@@ -4524,7 +4525,7 @@
           <a:p>
             <a:fld id="{F1C74198-B346-004F-9CEC-1B0B284102B3}" type="datetime1">
               <a:rPr lang="en-US" smtClean="0"/>
-              <a:t>2/14/23</a:t>
+              <a:t>2/15/23</a:t>
             </a:fld>
             <a:endParaRPr lang="en-US"/>
           </a:p>
@@ -4745,7 +4746,7 @@
           <a:p>
             <a:fld id="{350E8B2D-8E46-014A-98C7-7EFA12870A00}" type="datetime1">
               <a:rPr lang="en-US" smtClean="0"/>
-              <a:t>2/14/23</a:t>
+              <a:t>2/15/23</a:t>
             </a:fld>
             <a:endParaRPr lang="en-US"/>
           </a:p>
@@ -6540,7 +6541,7 @@
                   <a:schemeClr val="bg1"/>
                 </a:solidFill>
               </a:rPr>
-              <a:t>Wrapper</a:t>
+              <a:t>Wrapper Forward Selection</a:t>
             </a:r>
           </a:p>
         </p:txBody>
@@ -6598,8 +6599,8 @@
         </p:nvSpPr>
         <p:spPr>
           <a:xfrm>
-            <a:off x="1391521" y="2453576"/>
-            <a:ext cx="6229089" cy="1477328"/>
+            <a:off x="1391521" y="1914967"/>
+            <a:ext cx="6229089" cy="2554545"/>
           </a:xfrm>
           <a:prstGeom prst="rect">
             <a:avLst/>
@@ -6612,45 +6613,21 @@
           </a:bodyPr>
           <a:lstStyle/>
           <a:p>
-            <a:pPr algn="ctr"/>
-            <a:r>
-              <a:rPr lang="en-GB" b="1" i="0" dirty="0">
-                <a:solidFill>
-                  <a:srgbClr val="FFFFFF"/>
+            <a:pPr algn="just"/>
+            <a:r>
+              <a:rPr lang="en-GB" sz="1600" b="0" i="0" dirty="0">
+                <a:solidFill>
+                  <a:schemeClr val="bg1"/>
                 </a:solidFill>
                 <a:effectLst/>
-                <a:latin typeface="-apple-system"/>
               </a:rPr>
-              <a:t>Wrapper Forward selection:</a:t>
-            </a:r>
-          </a:p>
-          <a:p>
-            <a:pPr algn="ctr"/>
-            <a:r>
-              <a:rPr lang="en-GB" dirty="0">
-                <a:solidFill>
-                  <a:srgbClr val="FFFFFF"/>
-                </a:solidFill>
-                <a:latin typeface="-apple-system"/>
-              </a:rPr>
-              <a:t>S</a:t>
-            </a:r>
-            <a:r>
-              <a:rPr lang="en-GB" b="0" i="0" dirty="0">
-                <a:solidFill>
-                  <a:srgbClr val="FFFFFF"/>
-                </a:solidFill>
-                <a:effectLst/>
-                <a:latin typeface="-apple-system"/>
-              </a:rPr>
-              <a:t>tarts with one feature and adds more iteratively. At each subsequent iteration, the best of the remaining original features are added based on performance criteria. For this implementation we used Logistic Regression.</a:t>
-            </a:r>
-            <a:endParaRPr lang="en-GB" b="1" i="0" dirty="0">
+              <a:t>Wrapper Forward Selection is a feature selection method that involves selecting features in a stepwise manner. The process starts with an empty set of features and iteratively adds one feature at a time. At each step, the model is trained using the current set of features and the performance of the model is evaluated using a validation set. The feature that improves the performance the most is added to the set of selected features. This process is repeated until a stopping criterion is met (e.g., a maximum number of features is reached or the performance improvement is below a threshold). For this implementation we used Logistic Regression and kept half the features as a final result.</a:t>
+            </a:r>
+            <a:endParaRPr lang="en-GB" sz="1600" b="1" i="0" dirty="0">
               <a:solidFill>
-                <a:srgbClr val="FFFFFF"/>
+                <a:schemeClr val="bg1"/>
               </a:solidFill>
               <a:effectLst/>
-              <a:latin typeface="-apple-system"/>
             </a:endParaRPr>
           </a:p>
         </p:txBody>
@@ -6687,36 +6664,6 @@
       </p:grpSpPr>
       <p:sp>
         <p:nvSpPr>
-          <p:cNvPr id="2" name="Slide Number Placeholder 1">
-            <a:extLst>
-              <a:ext uri="{FF2B5EF4-FFF2-40B4-BE49-F238E27FC236}">
-                <a16:creationId xmlns:a16="http://schemas.microsoft.com/office/drawing/2014/main" id="{5B4FF148-3A8C-68FF-70ED-E12667E1B14A}"/>
-              </a:ext>
-            </a:extLst>
-          </p:cNvPr>
-          <p:cNvSpPr>
-            <a:spLocks noGrp="1"/>
-          </p:cNvSpPr>
-          <p:nvPr>
-            <p:ph type="sldNum" sz="quarter" idx="12"/>
-          </p:nvPr>
-        </p:nvSpPr>
-        <p:spPr/>
-        <p:txBody>
-          <a:bodyPr/>
-          <a:lstStyle/>
-          <a:p>
-            <a:fld id="{B82CCC60-E8CD-4174-8B1A-7DF615B22EEF}" type="slidenum">
-              <a:rPr lang="en-US" smtClean="0"/>
-              <a:pPr/>
-              <a:t>15</a:t>
-            </a:fld>
-            <a:endParaRPr lang="en-US"/>
-          </a:p>
-        </p:txBody>
-      </p:sp>
-      <p:sp>
-        <p:nvSpPr>
           <p:cNvPr id="5" name="Rectangle 4">
             <a:extLst>
               <a:ext uri="{FF2B5EF4-FFF2-40B4-BE49-F238E27FC236}">
@@ -6771,6 +6718,94 @@
       </p:sp>
       <p:sp>
         <p:nvSpPr>
+          <p:cNvPr id="6" name="Rounded Rectangle 5">
+            <a:extLst>
+              <a:ext uri="{FF2B5EF4-FFF2-40B4-BE49-F238E27FC236}">
+                <a16:creationId xmlns:a16="http://schemas.microsoft.com/office/drawing/2014/main" id="{33B8BBA8-C7E0-397B-96E7-C1DC9146874C}"/>
+              </a:ext>
+            </a:extLst>
+          </p:cNvPr>
+          <p:cNvSpPr/>
+          <p:nvPr/>
+        </p:nvSpPr>
+        <p:spPr>
+          <a:xfrm>
+            <a:off x="4897522" y="2858734"/>
+            <a:ext cx="2784817" cy="1634686"/>
+          </a:xfrm>
+          <a:prstGeom prst="roundRect">
+            <a:avLst/>
+          </a:prstGeom>
+          <a:solidFill>
+            <a:srgbClr val="111111"/>
+          </a:solidFill>
+          <a:ln w="19050">
+            <a:solidFill>
+              <a:srgbClr val="E434CB"/>
+            </a:solidFill>
+          </a:ln>
+        </p:spPr>
+        <p:style>
+          <a:lnRef idx="2">
+            <a:schemeClr val="accent1">
+              <a:shade val="50000"/>
+            </a:schemeClr>
+          </a:lnRef>
+          <a:fillRef idx="1">
+            <a:schemeClr val="accent1"/>
+          </a:fillRef>
+          <a:effectRef idx="0">
+            <a:schemeClr val="accent1"/>
+          </a:effectRef>
+          <a:fontRef idx="minor">
+            <a:schemeClr val="lt1"/>
+          </a:fontRef>
+        </p:style>
+        <p:txBody>
+          <a:bodyPr rtlCol="0" anchor="ctr"/>
+          <a:lstStyle/>
+          <a:p>
+            <a:pPr algn="ctr"/>
+            <a:endParaRPr lang="en-GR">
+              <a:solidFill>
+                <a:schemeClr val="tx1"/>
+              </a:solidFill>
+            </a:endParaRPr>
+          </a:p>
+        </p:txBody>
+      </p:sp>
+      <p:sp>
+        <p:nvSpPr>
+          <p:cNvPr id="2" name="Slide Number Placeholder 1">
+            <a:extLst>
+              <a:ext uri="{FF2B5EF4-FFF2-40B4-BE49-F238E27FC236}">
+                <a16:creationId xmlns:a16="http://schemas.microsoft.com/office/drawing/2014/main" id="{5B4FF148-3A8C-68FF-70ED-E12667E1B14A}"/>
+              </a:ext>
+            </a:extLst>
+          </p:cNvPr>
+          <p:cNvSpPr>
+            <a:spLocks noGrp="1"/>
+          </p:cNvSpPr>
+          <p:nvPr>
+            <p:ph type="sldNum" sz="quarter" idx="12"/>
+          </p:nvPr>
+        </p:nvSpPr>
+        <p:spPr/>
+        <p:txBody>
+          <a:bodyPr/>
+          <a:lstStyle/>
+          <a:p>
+            <a:fld id="{B82CCC60-E8CD-4174-8B1A-7DF615B22EEF}" type="slidenum">
+              <a:rPr lang="en-US" smtClean="0"/>
+              <a:pPr/>
+              <a:t>15</a:t>
+            </a:fld>
+            <a:endParaRPr lang="en-US"/>
+          </a:p>
+        </p:txBody>
+      </p:sp>
+      <p:sp>
+        <p:nvSpPr>
           <p:cNvPr id="8" name="Title 3">
             <a:extLst>
               <a:ext uri="{FF2B5EF4-FFF2-40B4-BE49-F238E27FC236}">
@@ -6822,6 +6857,501 @@
           </a:p>
         </p:txBody>
       </p:sp>
+      <p:sp>
+        <p:nvSpPr>
+          <p:cNvPr id="15" name="TextBox 14">
+            <a:extLst>
+              <a:ext uri="{FF2B5EF4-FFF2-40B4-BE49-F238E27FC236}">
+                <a16:creationId xmlns:a16="http://schemas.microsoft.com/office/drawing/2014/main" id="{70E9E803-BDBF-585F-E7EC-D10FAB672CE9}"/>
+              </a:ext>
+            </a:extLst>
+          </p:cNvPr>
+          <p:cNvSpPr txBox="1"/>
+          <p:nvPr/>
+        </p:nvSpPr>
+        <p:spPr>
+          <a:xfrm>
+            <a:off x="4983930" y="2937413"/>
+            <a:ext cx="2612000" cy="1477328"/>
+          </a:xfrm>
+          <a:prstGeom prst="rect">
+            <a:avLst/>
+          </a:prstGeom>
+          <a:noFill/>
+        </p:spPr>
+        <p:txBody>
+          <a:bodyPr wrap="square">
+            <a:spAutoFit/>
+          </a:bodyPr>
+          <a:lstStyle/>
+          <a:p>
+            <a:pPr algn="just">
+              <a:buFont typeface="Arial" panose="020B0604020202020204" pitchFamily="34" charset="0"/>
+              <a:buChar char="•"/>
+            </a:pPr>
+            <a:r>
+              <a:rPr lang="en-GB" sz="900" b="0" i="0" dirty="0">
+                <a:solidFill>
+                  <a:schemeClr val="bg1"/>
+                </a:solidFill>
+                <a:effectLst/>
+              </a:rPr>
+              <a:t> </a:t>
+            </a:r>
+            <a:r>
+              <a:rPr lang="en-GB" sz="900" b="0" i="0" dirty="0" err="1">
+                <a:solidFill>
+                  <a:schemeClr val="bg1"/>
+                </a:solidFill>
+                <a:effectLst/>
+              </a:rPr>
+              <a:t>N_training</a:t>
+            </a:r>
+            <a:r>
+              <a:rPr lang="en-GB" sz="900" dirty="0">
+                <a:solidFill>
+                  <a:schemeClr val="bg1"/>
+                </a:solidFill>
+              </a:rPr>
+              <a:t>: </a:t>
+            </a:r>
+            <a:r>
+              <a:rPr lang="en-GB" sz="900" b="0" i="0" dirty="0">
+                <a:solidFill>
+                  <a:schemeClr val="bg1"/>
+                </a:solidFill>
+                <a:effectLst/>
+              </a:rPr>
+              <a:t>the number of samples in the training set.</a:t>
+            </a:r>
+          </a:p>
+          <a:p>
+            <a:pPr algn="just">
+              <a:buFont typeface="Arial" panose="020B0604020202020204" pitchFamily="34" charset="0"/>
+              <a:buChar char="•"/>
+            </a:pPr>
+            <a:r>
+              <a:rPr lang="en-GB" sz="900" b="0" i="0" dirty="0">
+                <a:solidFill>
+                  <a:schemeClr val="bg1"/>
+                </a:solidFill>
+                <a:effectLst/>
+              </a:rPr>
+              <a:t> </a:t>
+            </a:r>
+            <a:r>
+              <a:rPr lang="en-GB" sz="900" b="0" i="0" dirty="0" err="1">
+                <a:solidFill>
+                  <a:schemeClr val="bg1"/>
+                </a:solidFill>
+                <a:effectLst/>
+              </a:rPr>
+              <a:t>y_real</a:t>
+            </a:r>
+            <a:r>
+              <a:rPr lang="en-GB" sz="900" b="0" i="0" dirty="0">
+                <a:solidFill>
+                  <a:schemeClr val="bg1"/>
+                </a:solidFill>
+                <a:effectLst/>
+              </a:rPr>
+              <a:t>(</a:t>
+            </a:r>
+            <a:r>
+              <a:rPr lang="en-GB" sz="900" b="0" i="0" dirty="0" err="1">
+                <a:solidFill>
+                  <a:schemeClr val="bg1"/>
+                </a:solidFill>
+                <a:effectLst/>
+              </a:rPr>
+              <a:t>i</a:t>
+            </a:r>
+            <a:r>
+              <a:rPr lang="en-GB" sz="900" b="0" i="0" dirty="0">
+                <a:solidFill>
+                  <a:schemeClr val="bg1"/>
+                </a:solidFill>
+                <a:effectLst/>
+              </a:rPr>
+              <a:t>): the true target value for the </a:t>
+            </a:r>
+            <a:r>
+              <a:rPr lang="en-GB" sz="900" b="0" i="0" dirty="0" err="1">
+                <a:solidFill>
+                  <a:schemeClr val="bg1"/>
+                </a:solidFill>
+                <a:effectLst/>
+              </a:rPr>
+              <a:t>i-th</a:t>
+            </a:r>
+            <a:r>
+              <a:rPr lang="en-GB" sz="900" b="0" i="0" dirty="0">
+                <a:solidFill>
+                  <a:schemeClr val="bg1"/>
+                </a:solidFill>
+                <a:effectLst/>
+              </a:rPr>
+              <a:t> sample</a:t>
+            </a:r>
+          </a:p>
+          <a:p>
+            <a:pPr algn="just">
+              <a:buFont typeface="Arial" panose="020B0604020202020204" pitchFamily="34" charset="0"/>
+              <a:buChar char="•"/>
+            </a:pPr>
+            <a:r>
+              <a:rPr lang="en-GB" sz="900" b="0" i="0" dirty="0">
+                <a:solidFill>
+                  <a:schemeClr val="bg1"/>
+                </a:solidFill>
+                <a:effectLst/>
+              </a:rPr>
+              <a:t> </a:t>
+            </a:r>
+            <a:r>
+              <a:rPr lang="en-GB" sz="900" b="0" i="0" dirty="0" err="1">
+                <a:solidFill>
+                  <a:schemeClr val="bg1"/>
+                </a:solidFill>
+                <a:effectLst/>
+              </a:rPr>
+              <a:t>y_pred</a:t>
+            </a:r>
+            <a:r>
+              <a:rPr lang="en-GB" sz="900" b="0" i="0" dirty="0">
+                <a:solidFill>
+                  <a:schemeClr val="bg1"/>
+                </a:solidFill>
+                <a:effectLst/>
+              </a:rPr>
+              <a:t>(</a:t>
+            </a:r>
+            <a:r>
+              <a:rPr lang="en-GB" sz="900" b="0" i="0" dirty="0" err="1">
+                <a:solidFill>
+                  <a:schemeClr val="bg1"/>
+                </a:solidFill>
+                <a:effectLst/>
+              </a:rPr>
+              <a:t>i</a:t>
+            </a:r>
+            <a:r>
+              <a:rPr lang="en-GB" sz="900" b="0" i="0" dirty="0">
+                <a:solidFill>
+                  <a:schemeClr val="bg1"/>
+                </a:solidFill>
+                <a:effectLst/>
+              </a:rPr>
+              <a:t>): the predicted target value for the </a:t>
+            </a:r>
+            <a:r>
+              <a:rPr lang="en-GB" sz="900" b="0" i="0" dirty="0" err="1">
+                <a:solidFill>
+                  <a:schemeClr val="bg1"/>
+                </a:solidFill>
+                <a:effectLst/>
+              </a:rPr>
+              <a:t>i-th</a:t>
+            </a:r>
+            <a:r>
+              <a:rPr lang="en-GB" sz="900" b="0" i="0" dirty="0">
+                <a:solidFill>
+                  <a:schemeClr val="bg1"/>
+                </a:solidFill>
+                <a:effectLst/>
+              </a:rPr>
+              <a:t> sample.</a:t>
+            </a:r>
+          </a:p>
+          <a:p>
+            <a:pPr algn="just">
+              <a:buFont typeface="Arial" panose="020B0604020202020204" pitchFamily="34" charset="0"/>
+              <a:buChar char="•"/>
+            </a:pPr>
+            <a:r>
+              <a:rPr lang="en-US" sz="900" b="0" i="0" dirty="0">
+                <a:solidFill>
+                  <a:schemeClr val="bg1"/>
+                </a:solidFill>
+                <a:effectLst/>
+              </a:rPr>
+              <a:t> </a:t>
+            </a:r>
+            <a:r>
+              <a:rPr lang="el-GR" sz="900" b="0" i="0" dirty="0">
+                <a:solidFill>
+                  <a:schemeClr val="bg1"/>
+                </a:solidFill>
+                <a:effectLst/>
+              </a:rPr>
+              <a:t>α_</a:t>
+            </a:r>
+            <a:r>
+              <a:rPr lang="en-GB" sz="900" b="0" i="0" dirty="0">
+                <a:solidFill>
+                  <a:schemeClr val="bg1"/>
+                </a:solidFill>
+                <a:effectLst/>
+              </a:rPr>
+              <a:t>j is the coefficient of the j-</a:t>
+            </a:r>
+            <a:r>
+              <a:rPr lang="en-GB" sz="900" b="0" i="0" dirty="0" err="1">
+                <a:solidFill>
+                  <a:schemeClr val="bg1"/>
+                </a:solidFill>
+                <a:effectLst/>
+              </a:rPr>
+              <a:t>th</a:t>
+            </a:r>
+            <a:r>
+              <a:rPr lang="en-GB" sz="900" b="0" i="0" dirty="0">
+                <a:solidFill>
+                  <a:schemeClr val="bg1"/>
+                </a:solidFill>
+                <a:effectLst/>
+              </a:rPr>
+              <a:t> feature in the linear regression model.</a:t>
+            </a:r>
+          </a:p>
+          <a:p>
+            <a:pPr algn="just">
+              <a:buFont typeface="Arial" panose="020B0604020202020204" pitchFamily="34" charset="0"/>
+              <a:buChar char="•"/>
+            </a:pPr>
+            <a:r>
+              <a:rPr lang="en-US" sz="900" b="0" i="0" dirty="0">
+                <a:solidFill>
+                  <a:schemeClr val="bg1"/>
+                </a:solidFill>
+                <a:effectLst/>
+              </a:rPr>
+              <a:t> </a:t>
+            </a:r>
+            <a:r>
+              <a:rPr lang="el-GR" sz="900" b="0" i="0" dirty="0">
+                <a:solidFill>
+                  <a:schemeClr val="bg1"/>
+                </a:solidFill>
+                <a:effectLst/>
+              </a:rPr>
+              <a:t>α </a:t>
+            </a:r>
+            <a:r>
+              <a:rPr lang="en-GB" sz="900" b="0" i="0" dirty="0">
+                <a:solidFill>
+                  <a:schemeClr val="bg1"/>
+                </a:solidFill>
+                <a:effectLst/>
+              </a:rPr>
+              <a:t>is the hyperparameter that controls the strength of the L1 penalty term.</a:t>
+            </a:r>
+          </a:p>
+          <a:p>
+            <a:pPr algn="just">
+              <a:buFont typeface="Arial" panose="020B0604020202020204" pitchFamily="34" charset="0"/>
+              <a:buChar char="•"/>
+            </a:pPr>
+            <a:r>
+              <a:rPr lang="en-GB" sz="900" b="0" i="0" dirty="0">
+                <a:solidFill>
+                  <a:schemeClr val="bg1"/>
+                </a:solidFill>
+                <a:effectLst/>
+              </a:rPr>
+              <a:t> n is the number of features in the dataset.</a:t>
+            </a:r>
+          </a:p>
+        </p:txBody>
+      </p:sp>
+      <p:sp>
+        <p:nvSpPr>
+          <p:cNvPr id="3" name="TextBox 2">
+            <a:extLst>
+              <a:ext uri="{FF2B5EF4-FFF2-40B4-BE49-F238E27FC236}">
+                <a16:creationId xmlns:a16="http://schemas.microsoft.com/office/drawing/2014/main" id="{0EE8435D-A628-4909-0029-4F25583AE077}"/>
+              </a:ext>
+            </a:extLst>
+          </p:cNvPr>
+          <p:cNvSpPr txBox="1"/>
+          <p:nvPr/>
+        </p:nvSpPr>
+        <p:spPr>
+          <a:xfrm>
+            <a:off x="1517455" y="2678885"/>
+            <a:ext cx="3207250" cy="1869743"/>
+          </a:xfrm>
+          <a:prstGeom prst="rect">
+            <a:avLst/>
+          </a:prstGeom>
+          <a:noFill/>
+        </p:spPr>
+        <p:txBody>
+          <a:bodyPr wrap="square">
+            <a:spAutoFit/>
+          </a:bodyPr>
+          <a:lstStyle/>
+          <a:p>
+            <a:pPr algn="just"/>
+            <a:r>
+              <a:rPr lang="en-GB" sz="1050" b="0" i="0" dirty="0">
+                <a:solidFill>
+                  <a:schemeClr val="bg1"/>
+                </a:solidFill>
+                <a:effectLst/>
+                <a:latin typeface="Söhne"/>
+              </a:rPr>
+              <a:t>The Lasso algorithm is a type of linear regression that is used for feature selection. It adds a penalty term to the regression objective function that penalizes the absolute values of the coefficients. This penalty term encourages many of the coefficients to be exactly zero, which has the effect of selecting a subset of the most important features. The hyperparameter </a:t>
+            </a:r>
+            <a:r>
+              <a:rPr lang="el-GR" sz="1050" b="0" i="0" dirty="0">
+                <a:solidFill>
+                  <a:schemeClr val="bg1"/>
+                </a:solidFill>
+                <a:effectLst/>
+                <a:latin typeface="Söhne"/>
+              </a:rPr>
+              <a:t>α </a:t>
+            </a:r>
+            <a:r>
+              <a:rPr lang="en-GB" sz="1050" b="0" i="0" dirty="0">
+                <a:solidFill>
+                  <a:schemeClr val="bg1"/>
+                </a:solidFill>
+                <a:effectLst/>
+                <a:latin typeface="Söhne"/>
+              </a:rPr>
+              <a:t>controls the strength of the penalty term and determines the trade-off between fitting the data well and keeping the model simple. The optimal value of </a:t>
+            </a:r>
+            <a:r>
+              <a:rPr lang="el-GR" sz="1050" b="0" i="0" dirty="0">
+                <a:solidFill>
+                  <a:schemeClr val="bg1"/>
+                </a:solidFill>
+                <a:effectLst/>
+                <a:latin typeface="Söhne"/>
+              </a:rPr>
+              <a:t>α </a:t>
+            </a:r>
+            <a:r>
+              <a:rPr lang="en-GB" sz="1050" b="0" i="0" dirty="0">
+                <a:solidFill>
+                  <a:schemeClr val="bg1"/>
+                </a:solidFill>
+                <a:effectLst/>
+                <a:latin typeface="Söhne"/>
+              </a:rPr>
+              <a:t>can be found using cross-validation.</a:t>
+            </a:r>
+            <a:endParaRPr lang="en-GB" sz="1050" b="0" i="0" dirty="0">
+              <a:solidFill>
+                <a:schemeClr val="bg1"/>
+              </a:solidFill>
+              <a:effectLst/>
+            </a:endParaRPr>
+          </a:p>
+        </p:txBody>
+      </p:sp>
+      <p:sp>
+        <p:nvSpPr>
+          <p:cNvPr id="13" name="Rounded Rectangle 12">
+            <a:extLst>
+              <a:ext uri="{FF2B5EF4-FFF2-40B4-BE49-F238E27FC236}">
+                <a16:creationId xmlns:a16="http://schemas.microsoft.com/office/drawing/2014/main" id="{5C917F28-82A2-55CF-86C2-7B263D421783}"/>
+              </a:ext>
+            </a:extLst>
+          </p:cNvPr>
+          <p:cNvSpPr/>
+          <p:nvPr/>
+        </p:nvSpPr>
+        <p:spPr>
+          <a:xfrm>
+            <a:off x="1517455" y="1748794"/>
+            <a:ext cx="3293658" cy="838201"/>
+          </a:xfrm>
+          <a:prstGeom prst="roundRect">
+            <a:avLst/>
+          </a:prstGeom>
+          <a:solidFill>
+            <a:srgbClr val="111111"/>
+          </a:solidFill>
+          <a:ln w="19050">
+            <a:solidFill>
+              <a:srgbClr val="E434CB"/>
+            </a:solidFill>
+          </a:ln>
+        </p:spPr>
+        <p:style>
+          <a:lnRef idx="2">
+            <a:schemeClr val="accent1">
+              <a:shade val="50000"/>
+            </a:schemeClr>
+          </a:lnRef>
+          <a:fillRef idx="1">
+            <a:schemeClr val="accent1"/>
+          </a:fillRef>
+          <a:effectRef idx="0">
+            <a:schemeClr val="accent1"/>
+          </a:effectRef>
+          <a:fontRef idx="minor">
+            <a:schemeClr val="lt1"/>
+          </a:fontRef>
+        </p:style>
+        <p:txBody>
+          <a:bodyPr rtlCol="0" anchor="ctr"/>
+          <a:lstStyle/>
+          <a:p>
+            <a:pPr algn="ctr"/>
+            <a:endParaRPr lang="en-GR">
+              <a:solidFill>
+                <a:schemeClr val="tx1"/>
+              </a:solidFill>
+            </a:endParaRPr>
+          </a:p>
+        </p:txBody>
+      </p:sp>
+      <p:cxnSp>
+        <p:nvCxnSpPr>
+          <p:cNvPr id="9" name="Curved Connector 8">
+            <a:extLst>
+              <a:ext uri="{FF2B5EF4-FFF2-40B4-BE49-F238E27FC236}">
+                <a16:creationId xmlns:a16="http://schemas.microsoft.com/office/drawing/2014/main" id="{67D7B2DD-598B-FBE7-D453-9CD3DDD8FC9F}"/>
+              </a:ext>
+            </a:extLst>
+          </p:cNvPr>
+          <p:cNvCxnSpPr>
+            <a:cxnSpLocks/>
+            <a:endCxn id="6" idx="0"/>
+          </p:cNvCxnSpPr>
+          <p:nvPr/>
+        </p:nvCxnSpPr>
+        <p:spPr>
+          <a:xfrm>
+            <a:off x="4811113" y="2127103"/>
+            <a:ext cx="1478818" cy="731631"/>
+          </a:xfrm>
+          <a:prstGeom prst="curvedConnector2">
+            <a:avLst/>
+          </a:prstGeom>
+          <a:ln>
+            <a:tailEnd type="triangle"/>
+          </a:ln>
+        </p:spPr>
+        <p:style>
+          <a:lnRef idx="1">
+            <a:schemeClr val="accent1"/>
+          </a:lnRef>
+          <a:fillRef idx="0">
+            <a:schemeClr val="accent1"/>
+          </a:fillRef>
+          <a:effectRef idx="0">
+            <a:schemeClr val="accent1"/>
+          </a:effectRef>
+          <a:fontRef idx="minor">
+            <a:schemeClr val="tx1"/>
+          </a:fontRef>
+        </p:style>
+      </p:cxnSp>
       <p:pic>
         <p:nvPicPr>
           <p:cNvPr id="4" name="Picture 3" descr="Text&#10;&#10;Description automatically generated with medium confidence">
@@ -6859,8 +7389,8 @@
         </p:blipFill>
         <p:spPr>
           <a:xfrm>
-            <a:off x="2895599" y="2339911"/>
-            <a:ext cx="3352800" cy="838200"/>
+            <a:off x="1674254" y="1785245"/>
+            <a:ext cx="3050451" cy="762613"/>
           </a:xfrm>
           <a:prstGeom prst="rect">
             <a:avLst/>
@@ -6870,57 +7400,6 @@
           </a:solidFill>
         </p:spPr>
       </p:pic>
-      <p:sp>
-        <p:nvSpPr>
-          <p:cNvPr id="15" name="TextBox 14">
-            <a:extLst>
-              <a:ext uri="{FF2B5EF4-FFF2-40B4-BE49-F238E27FC236}">
-                <a16:creationId xmlns:a16="http://schemas.microsoft.com/office/drawing/2014/main" id="{70E9E803-BDBF-585F-E7EC-D10FAB672CE9}"/>
-              </a:ext>
-            </a:extLst>
-          </p:cNvPr>
-          <p:cNvSpPr txBox="1"/>
-          <p:nvPr/>
-        </p:nvSpPr>
-        <p:spPr>
-          <a:xfrm>
-            <a:off x="2128720" y="3245347"/>
-            <a:ext cx="5194323" cy="923330"/>
-          </a:xfrm>
-          <a:prstGeom prst="rect">
-            <a:avLst/>
-          </a:prstGeom>
-          <a:noFill/>
-        </p:spPr>
-        <p:txBody>
-          <a:bodyPr wrap="square">
-            <a:spAutoFit/>
-          </a:bodyPr>
-          <a:lstStyle/>
-          <a:p>
-            <a:r>
-              <a:rPr lang="en-GB" dirty="0">
-                <a:solidFill>
-                  <a:srgbClr val="FFFFFF"/>
-                </a:solidFill>
-                <a:latin typeface="-apple-system"/>
-              </a:rPr>
-              <a:t>W</a:t>
-            </a:r>
-            <a:r>
-              <a:rPr lang="en-GB" b="0" i="0" dirty="0">
-                <a:solidFill>
-                  <a:srgbClr val="FFFFFF"/>
-                </a:solidFill>
-                <a:effectLst/>
-                <a:latin typeface="-apple-system"/>
-              </a:rPr>
-              <a:t>e fit a Lasso regression on a scaled version of our dataset and we consider only those features that have a coefficient different from 0. </a:t>
-            </a:r>
-            <a:endParaRPr lang="en-GR" dirty="0"/>
-          </a:p>
-        </p:txBody>
-      </p:sp>
     </p:spTree>
     <p:extLst>
       <p:ext uri="{BB962C8B-B14F-4D97-AF65-F5344CB8AC3E}">
@@ -7115,8 +7594,8 @@
         </p:blipFill>
         <p:spPr>
           <a:xfrm>
-            <a:off x="1365195" y="1688262"/>
-            <a:ext cx="2748690" cy="3021358"/>
+            <a:off x="1489821" y="1754341"/>
+            <a:ext cx="2403241" cy="2641641"/>
           </a:xfrm>
           <a:prstGeom prst="rect">
             <a:avLst/>
@@ -7137,8 +7616,8 @@
         </p:nvSpPr>
         <p:spPr>
           <a:xfrm>
-            <a:off x="4724705" y="1822431"/>
-            <a:ext cx="1985165" cy="2585323"/>
+            <a:off x="4183430" y="2336498"/>
+            <a:ext cx="3331431" cy="1477328"/>
           </a:xfrm>
           <a:prstGeom prst="rect">
             <a:avLst/>
@@ -7151,7 +7630,7 @@
           </a:bodyPr>
           <a:lstStyle/>
           <a:p>
-            <a:pPr algn="ctr"/>
+            <a:pPr algn="just"/>
             <a:r>
               <a:rPr lang="en-GR" dirty="0">
                 <a:solidFill>
@@ -7159,6 +7638,76 @@
                 </a:solidFill>
               </a:rPr>
               <a:t>At this point a vote was applied by each and every method and only the features that had the majority of the votes (3 or 4) stayed for the final feature vector</a:t>
+            </a:r>
+          </a:p>
+        </p:txBody>
+      </p:sp>
+      <p:sp>
+        <p:nvSpPr>
+          <p:cNvPr id="3" name="TextBox 2">
+            <a:extLst>
+              <a:ext uri="{FF2B5EF4-FFF2-40B4-BE49-F238E27FC236}">
+                <a16:creationId xmlns:a16="http://schemas.microsoft.com/office/drawing/2014/main" id="{9A4851CD-E8D2-CA87-03A1-DF6D43635D41}"/>
+              </a:ext>
+            </a:extLst>
+          </p:cNvPr>
+          <p:cNvSpPr txBox="1"/>
+          <p:nvPr/>
+        </p:nvSpPr>
+        <p:spPr>
+          <a:xfrm>
+            <a:off x="2590801" y="4305599"/>
+            <a:ext cx="200804" cy="461665"/>
+          </a:xfrm>
+          <a:prstGeom prst="rect">
+            <a:avLst/>
+          </a:prstGeom>
+          <a:noFill/>
+        </p:spPr>
+        <p:txBody>
+          <a:bodyPr wrap="square" rtlCol="0" anchor="ctr">
+            <a:spAutoFit/>
+          </a:bodyPr>
+          <a:lstStyle/>
+          <a:p>
+            <a:pPr algn="ctr"/>
+            <a:r>
+              <a:rPr lang="en-GR" sz="800" dirty="0">
+                <a:solidFill>
+                  <a:schemeClr val="bg1"/>
+                </a:solidFill>
+              </a:rPr>
+              <a:t>.</a:t>
+            </a:r>
+            <a:br>
+              <a:rPr lang="en-GR" sz="800" dirty="0">
+                <a:solidFill>
+                  <a:schemeClr val="bg1"/>
+                </a:solidFill>
+              </a:rPr>
+            </a:br>
+            <a:r>
+              <a:rPr lang="en-GR" sz="800" dirty="0">
+                <a:solidFill>
+                  <a:schemeClr val="bg1"/>
+                </a:solidFill>
+              </a:rPr>
+              <a:t>.</a:t>
+            </a:r>
+            <a:br>
+              <a:rPr lang="en-GR" sz="800" dirty="0">
+                <a:solidFill>
+                  <a:schemeClr val="bg1"/>
+                </a:solidFill>
+              </a:rPr>
+            </a:br>
+            <a:r>
+              <a:rPr lang="en-GR" sz="800" dirty="0">
+                <a:solidFill>
+                  <a:schemeClr val="bg1"/>
+                </a:solidFill>
+              </a:rPr>
+              <a:t>.</a:t>
             </a:r>
           </a:p>
         </p:txBody>
@@ -8182,55 +8731,31 @@
       </p:grpSpPr>
       <p:sp>
         <p:nvSpPr>
-          <p:cNvPr id="5" name="Rectangle 4">
-            <a:extLst>
-              <a:ext uri="{FF2B5EF4-FFF2-40B4-BE49-F238E27FC236}">
-                <a16:creationId xmlns:a16="http://schemas.microsoft.com/office/drawing/2014/main" id="{46271187-3996-B1BC-FF20-371238B19BA6}"/>
-              </a:ext>
-            </a:extLst>
-          </p:cNvPr>
-          <p:cNvSpPr/>
-          <p:nvPr/>
-        </p:nvSpPr>
-        <p:spPr>
-          <a:xfrm>
-            <a:off x="0" y="1383060"/>
-            <a:ext cx="9162300" cy="3760440"/>
-          </a:xfrm>
-          <a:prstGeom prst="rect">
-            <a:avLst/>
-          </a:prstGeom>
-          <a:solidFill>
-            <a:srgbClr val="2D081E"/>
-          </a:solidFill>
-          <a:ln w="38100">
-            <a:solidFill>
-              <a:srgbClr val="E434CB"/>
-            </a:solidFill>
-          </a:ln>
-        </p:spPr>
-        <p:style>
-          <a:lnRef idx="2">
-            <a:schemeClr val="accent1">
-              <a:shade val="50000"/>
-            </a:schemeClr>
-          </a:lnRef>
-          <a:fillRef idx="1">
-            <a:schemeClr val="accent1"/>
-          </a:fillRef>
-          <a:effectRef idx="0">
-            <a:schemeClr val="accent1"/>
-          </a:effectRef>
-          <a:fontRef idx="minor">
-            <a:schemeClr val="lt1"/>
-          </a:fontRef>
-        </p:style>
-        <p:txBody>
-          <a:bodyPr rtlCol="0" anchor="ctr"/>
-          <a:lstStyle/>
-          <a:p>
-            <a:pPr algn="ctr"/>
-            <a:endParaRPr lang="en-GR"/>
+          <p:cNvPr id="4" name="Title 3"/>
+          <p:cNvSpPr>
+            <a:spLocks noGrp="1"/>
+          </p:cNvSpPr>
+          <p:nvPr>
+            <p:ph type="title"/>
+          </p:nvPr>
+        </p:nvSpPr>
+        <p:spPr/>
+        <p:txBody>
+          <a:bodyPr/>
+          <a:lstStyle/>
+          <a:p>
+            <a:pPr algn="l"/>
+            <a:r>
+              <a:rPr lang="en-US" dirty="0"/>
+              <a:t>Model Training &amp; Evaluation</a:t>
+            </a:r>
+            <a:endParaRPr lang="en-GB" b="1" i="0" dirty="0">
+              <a:solidFill>
+                <a:srgbClr val="FFFFFF"/>
+              </a:solidFill>
+              <a:effectLst/>
+              <a:latin typeface="-apple-system"/>
+            </a:endParaRPr>
           </a:p>
         </p:txBody>
       </p:sp>
@@ -8239,7 +8764,7 @@
           <p:cNvPr id="2" name="Slide Number Placeholder 1">
             <a:extLst>
               <a:ext uri="{FF2B5EF4-FFF2-40B4-BE49-F238E27FC236}">
-                <a16:creationId xmlns:a16="http://schemas.microsoft.com/office/drawing/2014/main" id="{5B4FF148-3A8C-68FF-70ED-E12667E1B14A}"/>
+                <a16:creationId xmlns:a16="http://schemas.microsoft.com/office/drawing/2014/main" id="{C94BDE27-BC72-7EE9-6D0C-5552586D05E7}"/>
               </a:ext>
             </a:extLst>
           </p:cNvPr>
@@ -8266,171 +8791,205 @@
       </p:sp>
       <p:sp>
         <p:nvSpPr>
-          <p:cNvPr id="8" name="Title 3">
+          <p:cNvPr id="5" name="TextBox 4">
             <a:extLst>
               <a:ext uri="{FF2B5EF4-FFF2-40B4-BE49-F238E27FC236}">
-                <a16:creationId xmlns:a16="http://schemas.microsoft.com/office/drawing/2014/main" id="{57F3F99E-E37A-82F9-5CD0-39F7548D7501}"/>
+                <a16:creationId xmlns:a16="http://schemas.microsoft.com/office/drawing/2014/main" id="{8C52B47F-E64A-324E-C4E8-2A70687228F0}"/>
               </a:ext>
             </a:extLst>
           </p:cNvPr>
-          <p:cNvSpPr txBox="1">
-            <a:spLocks/>
-          </p:cNvSpPr>
+          <p:cNvSpPr txBox="1"/>
           <p:nvPr/>
         </p:nvSpPr>
         <p:spPr>
           <a:xfrm>
-            <a:off x="3655770" y="1"/>
-            <a:ext cx="5488230" cy="1383059"/>
+            <a:off x="2434131" y="1350109"/>
+            <a:ext cx="6108199" cy="3293209"/>
           </a:xfrm>
           <a:prstGeom prst="rect">
             <a:avLst/>
           </a:prstGeom>
-        </p:spPr>
-        <p:txBody>
-          <a:bodyPr anchor="ctr"/>
-          <a:lstStyle>
-            <a:lvl1pPr algn="ctr" defTabSz="914400" rtl="0" eaLnBrk="1" latinLnBrk="0" hangingPunct="1">
-              <a:spcBef>
-                <a:spcPct val="0"/>
-              </a:spcBef>
-              <a:buNone/>
-              <a:defRPr sz="4400" kern="1200">
-                <a:solidFill>
-                  <a:schemeClr val="tx1"/>
-                </a:solidFill>
-                <a:latin typeface="+mj-lt"/>
-                <a:ea typeface="+mj-ea"/>
-                <a:cs typeface="+mj-cs"/>
-              </a:defRPr>
-            </a:lvl1pPr>
-          </a:lstStyle>
-          <a:p>
-            <a:r>
-              <a:rPr lang="en-US" sz="2800" dirty="0">
+          <a:noFill/>
+        </p:spPr>
+        <p:txBody>
+          <a:bodyPr wrap="square">
+            <a:spAutoFit/>
+          </a:bodyPr>
+          <a:lstStyle/>
+          <a:p>
+            <a:pPr algn="l">
+              <a:buFont typeface="Arial" panose="020B0604020202020204" pitchFamily="34" charset="0"/>
+              <a:buChar char="•"/>
+            </a:pPr>
+            <a:r>
+              <a:rPr lang="en-GB" sz="1600" b="1" i="0" dirty="0">
                 <a:solidFill>
                   <a:schemeClr val="bg1"/>
                 </a:solidFill>
+                <a:effectLst/>
               </a:rPr>
-              <a:t>Model Training &amp; Evaluation</a:t>
-            </a:r>
-            <a:endParaRPr lang="en-US" sz="3600" dirty="0">
+              <a:t>Accuracy</a:t>
+            </a:r>
+            <a:r>
+              <a:rPr lang="en-GB" sz="1600" b="0" i="0" dirty="0">
+                <a:solidFill>
+                  <a:schemeClr val="bg1"/>
+                </a:solidFill>
+                <a:effectLst/>
+              </a:rPr>
+              <a:t>: Measures how often a model correctly predicts the target class.</a:t>
+            </a:r>
+          </a:p>
+          <a:p>
+            <a:pPr algn="l">
+              <a:buFont typeface="Arial" panose="020B0604020202020204" pitchFamily="34" charset="0"/>
+              <a:buChar char="•"/>
+            </a:pPr>
+            <a:endParaRPr lang="en-GB" sz="1600" b="0" i="0" dirty="0">
               <a:solidFill>
                 <a:schemeClr val="bg1"/>
               </a:solidFill>
+              <a:effectLst/>
             </a:endParaRPr>
           </a:p>
-        </p:txBody>
-      </p:sp>
-      <p:pic>
-        <p:nvPicPr>
-          <p:cNvPr id="4" name="Picture 3" descr="Graphical user interface, chart, bar chart&#10;&#10;Description automatically generated">
-            <a:extLst>
-              <a:ext uri="{FF2B5EF4-FFF2-40B4-BE49-F238E27FC236}">
-                <a16:creationId xmlns:a16="http://schemas.microsoft.com/office/drawing/2014/main" id="{18788304-E191-501C-18A5-71AC610B9785}"/>
-              </a:ext>
-            </a:extLst>
-          </p:cNvPr>
-          <p:cNvPicPr>
-            <a:picLocks noChangeAspect="1"/>
-          </p:cNvPicPr>
-          <p:nvPr/>
-        </p:nvPicPr>
-        <p:blipFill rotWithShape="1">
-          <a:blip r:embed="rId3">
-            <a:extLst>
-              <a:ext uri="{28A0092B-C50C-407E-A947-70E740481C1C}">
-                <a14:useLocalDpi xmlns:a14="http://schemas.microsoft.com/office/drawing/2010/main" val="0"/>
-              </a:ext>
-            </a:extLst>
-          </a:blip>
-          <a:srcRect l="84" t="33440" r="-598" b="33654"/>
-          <a:stretch/>
-        </p:blipFill>
-        <p:spPr>
-          <a:xfrm>
-            <a:off x="296260" y="3257760"/>
-            <a:ext cx="4628071" cy="1508735"/>
-          </a:xfrm>
-          <a:prstGeom prst="rect">
-            <a:avLst/>
-          </a:prstGeom>
-        </p:spPr>
-      </p:pic>
-      <p:pic>
-        <p:nvPicPr>
-          <p:cNvPr id="7" name="Picture 6" descr="Graphical user interface, chart, bar chart&#10;&#10;Description automatically generated">
-            <a:extLst>
-              <a:ext uri="{FF2B5EF4-FFF2-40B4-BE49-F238E27FC236}">
-                <a16:creationId xmlns:a16="http://schemas.microsoft.com/office/drawing/2014/main" id="{4BA1EDF3-565E-7EC5-B6A8-D8A87141F01D}"/>
-              </a:ext>
-            </a:extLst>
-          </p:cNvPr>
-          <p:cNvPicPr>
-            <a:picLocks noChangeAspect="1"/>
-          </p:cNvPicPr>
-          <p:nvPr/>
-        </p:nvPicPr>
-        <p:blipFill rotWithShape="1">
-          <a:blip r:embed="rId3">
-            <a:extLst>
-              <a:ext uri="{28A0092B-C50C-407E-A947-70E740481C1C}">
-                <a14:useLocalDpi xmlns:a14="http://schemas.microsoft.com/office/drawing/2010/main" val="0"/>
-              </a:ext>
-            </a:extLst>
-          </a:blip>
-          <a:srcRect t="640" r="-513" b="66453"/>
-          <a:stretch/>
-        </p:blipFill>
-        <p:spPr>
-          <a:xfrm>
-            <a:off x="296260" y="1760064"/>
-            <a:ext cx="4628071" cy="1508735"/>
-          </a:xfrm>
-          <a:prstGeom prst="rect">
-            <a:avLst/>
-          </a:prstGeom>
-        </p:spPr>
-      </p:pic>
-      <p:pic>
-        <p:nvPicPr>
-          <p:cNvPr id="12" name="Picture 11" descr="Graphical user interface, chart, bar chart&#10;&#10;Description automatically generated">
-            <a:extLst>
-              <a:ext uri="{FF2B5EF4-FFF2-40B4-BE49-F238E27FC236}">
-                <a16:creationId xmlns:a16="http://schemas.microsoft.com/office/drawing/2014/main" id="{AB50BAA7-69B0-BADC-60E3-55E75667FB2C}"/>
-              </a:ext>
-            </a:extLst>
-          </p:cNvPr>
-          <p:cNvPicPr>
-            <a:picLocks noChangeAspect="1"/>
-          </p:cNvPicPr>
-          <p:nvPr/>
-        </p:nvPicPr>
-        <p:blipFill rotWithShape="1">
-          <a:blip r:embed="rId3">
-            <a:extLst>
-              <a:ext uri="{28A0092B-C50C-407E-A947-70E740481C1C}">
-                <a14:useLocalDpi xmlns:a14="http://schemas.microsoft.com/office/drawing/2010/main" val="0"/>
-              </a:ext>
-            </a:extLst>
-          </a:blip>
-          <a:srcRect l="159" t="68368" r="35218"/>
-          <a:stretch/>
-        </p:blipFill>
-        <p:spPr>
-          <a:xfrm>
-            <a:off x="4876206" y="3257759"/>
-            <a:ext cx="3095302" cy="1508735"/>
-          </a:xfrm>
-          <a:prstGeom prst="rect">
-            <a:avLst/>
-          </a:prstGeom>
-        </p:spPr>
-      </p:pic>
+          <a:p>
+            <a:pPr algn="l">
+              <a:buFont typeface="Arial" panose="020B0604020202020204" pitchFamily="34" charset="0"/>
+              <a:buChar char="•"/>
+            </a:pPr>
+            <a:r>
+              <a:rPr lang="en-GB" sz="1600" b="1" i="0" dirty="0">
+                <a:solidFill>
+                  <a:schemeClr val="bg1"/>
+                </a:solidFill>
+                <a:effectLst/>
+              </a:rPr>
+              <a:t>F1 Score</a:t>
+            </a:r>
+            <a:r>
+              <a:rPr lang="en-GB" sz="1600" b="0" i="0" dirty="0">
+                <a:solidFill>
+                  <a:schemeClr val="bg1"/>
+                </a:solidFill>
+                <a:effectLst/>
+              </a:rPr>
+              <a:t>: Measures the balance between precision and recall.</a:t>
+            </a:r>
+          </a:p>
+          <a:p>
+            <a:pPr algn="l">
+              <a:buFont typeface="Arial" panose="020B0604020202020204" pitchFamily="34" charset="0"/>
+              <a:buChar char="•"/>
+            </a:pPr>
+            <a:endParaRPr lang="en-GB" sz="1600" b="0" i="0" dirty="0">
+              <a:solidFill>
+                <a:schemeClr val="bg1"/>
+              </a:solidFill>
+              <a:effectLst/>
+            </a:endParaRPr>
+          </a:p>
+          <a:p>
+            <a:pPr algn="l">
+              <a:buFont typeface="Arial" panose="020B0604020202020204" pitchFamily="34" charset="0"/>
+              <a:buChar char="•"/>
+            </a:pPr>
+            <a:r>
+              <a:rPr lang="en-GB" sz="1600" b="1" i="0" dirty="0">
+                <a:solidFill>
+                  <a:schemeClr val="bg1"/>
+                </a:solidFill>
+                <a:effectLst/>
+              </a:rPr>
+              <a:t>Precision</a:t>
+            </a:r>
+            <a:r>
+              <a:rPr lang="en-GB" sz="1600" b="0" i="0" dirty="0">
+                <a:solidFill>
+                  <a:schemeClr val="bg1"/>
+                </a:solidFill>
+                <a:effectLst/>
+              </a:rPr>
+              <a:t>: Measures how often the model correctly identifies a positive instance.</a:t>
+            </a:r>
+          </a:p>
+          <a:p>
+            <a:pPr algn="l">
+              <a:buFont typeface="Arial" panose="020B0604020202020204" pitchFamily="34" charset="0"/>
+              <a:buChar char="•"/>
+            </a:pPr>
+            <a:endParaRPr lang="en-GB" sz="1600" b="0" i="0" dirty="0">
+              <a:solidFill>
+                <a:schemeClr val="bg1"/>
+              </a:solidFill>
+              <a:effectLst/>
+            </a:endParaRPr>
+          </a:p>
+          <a:p>
+            <a:pPr algn="l">
+              <a:buFont typeface="Arial" panose="020B0604020202020204" pitchFamily="34" charset="0"/>
+              <a:buChar char="•"/>
+            </a:pPr>
+            <a:r>
+              <a:rPr lang="en-GB" sz="1600" b="1" i="0" dirty="0">
+                <a:solidFill>
+                  <a:schemeClr val="bg1"/>
+                </a:solidFill>
+                <a:effectLst/>
+              </a:rPr>
+              <a:t>Recall</a:t>
+            </a:r>
+            <a:r>
+              <a:rPr lang="en-GB" sz="1600" b="0" i="0" dirty="0">
+                <a:solidFill>
+                  <a:schemeClr val="bg1"/>
+                </a:solidFill>
+                <a:effectLst/>
+              </a:rPr>
+              <a:t>: Measures how often the model correctly identifies all positive instances.</a:t>
+            </a:r>
+          </a:p>
+          <a:p>
+            <a:pPr algn="l">
+              <a:buFont typeface="Arial" panose="020B0604020202020204" pitchFamily="34" charset="0"/>
+              <a:buChar char="•"/>
+            </a:pPr>
+            <a:endParaRPr lang="en-GB" sz="1600" b="0" i="0" dirty="0">
+              <a:solidFill>
+                <a:schemeClr val="bg1"/>
+              </a:solidFill>
+              <a:effectLst/>
+            </a:endParaRPr>
+          </a:p>
+          <a:p>
+            <a:pPr algn="l">
+              <a:buFont typeface="Arial" panose="020B0604020202020204" pitchFamily="34" charset="0"/>
+              <a:buChar char="•"/>
+            </a:pPr>
+            <a:r>
+              <a:rPr lang="en-GB" sz="1600" b="1" i="0" dirty="0">
+                <a:solidFill>
+                  <a:schemeClr val="bg1"/>
+                </a:solidFill>
+                <a:effectLst/>
+              </a:rPr>
+              <a:t>Balanced Accuracy</a:t>
+            </a:r>
+            <a:r>
+              <a:rPr lang="en-GB" sz="1600" b="0" i="0" dirty="0">
+                <a:solidFill>
+                  <a:schemeClr val="bg1"/>
+                </a:solidFill>
+                <a:effectLst/>
+              </a:rPr>
+              <a:t>: Measures the average recall obtained on each class, useful when classes are imbalanced.</a:t>
+            </a:r>
+          </a:p>
+        </p:txBody>
+      </p:sp>
     </p:spTree>
     <p:extLst>
       <p:ext uri="{BB962C8B-B14F-4D97-AF65-F5344CB8AC3E}">
-        <p14:creationId xmlns:p14="http://schemas.microsoft.com/office/powerpoint/2010/main" val="3583579677"/>
+        <p14:creationId xmlns:p14="http://schemas.microsoft.com/office/powerpoint/2010/main" val="831775297"/>
       </p:ext>
     </p:extLst>
   </p:cSld>
@@ -8471,7 +9030,7 @@
         </p:nvSpPr>
         <p:spPr>
           <a:xfrm>
-            <a:off x="46144" y="1390568"/>
+            <a:off x="0" y="1383060"/>
             <a:ext cx="9162300" cy="3760440"/>
           </a:xfrm>
           <a:prstGeom prst="rect">
@@ -8601,10 +9160,10 @@
       </p:sp>
       <p:pic>
         <p:nvPicPr>
-          <p:cNvPr id="13" name="Picture 12" descr="Graphical user interface, text, application&#10;&#10;Description automatically generated">
+          <p:cNvPr id="4" name="Picture 3" descr="Graphical user interface, chart, bar chart&#10;&#10;Description automatically generated">
             <a:extLst>
               <a:ext uri="{FF2B5EF4-FFF2-40B4-BE49-F238E27FC236}">
-                <a16:creationId xmlns:a16="http://schemas.microsoft.com/office/drawing/2014/main" id="{C29B6A94-3EDC-D7EB-0DB6-B7630205339B}"/>
+                <a16:creationId xmlns:a16="http://schemas.microsoft.com/office/drawing/2014/main" id="{18788304-E191-501C-18A5-71AC610B9785}"/>
               </a:ext>
             </a:extLst>
           </p:cNvPr>
@@ -8613,7 +9172,7 @@
           </p:cNvPicPr>
           <p:nvPr/>
         </p:nvPicPr>
-        <p:blipFill>
+        <p:blipFill rotWithShape="1">
           <a:blip r:embed="rId3">
             <a:extLst>
               <a:ext uri="{28A0092B-C50C-407E-A947-70E740481C1C}">
@@ -8621,14 +9180,13 @@
               </a:ext>
             </a:extLst>
           </a:blip>
-          <a:stretch>
-            <a:fillRect/>
-          </a:stretch>
+          <a:srcRect l="84" t="33440" r="-598" b="33654"/>
+          <a:stretch/>
         </p:blipFill>
         <p:spPr>
           <a:xfrm>
-            <a:off x="4567818" y="1461389"/>
-            <a:ext cx="4442114" cy="1825900"/>
+            <a:off x="296260" y="3257760"/>
+            <a:ext cx="4628071" cy="1508735"/>
           </a:xfrm>
           <a:prstGeom prst="rect">
             <a:avLst/>
@@ -8637,10 +9195,10 @@
       </p:pic>
       <p:pic>
         <p:nvPicPr>
-          <p:cNvPr id="15" name="Picture 14" descr="Graphical user interface, text, application&#10;&#10;Description automatically generated">
+          <p:cNvPr id="7" name="Picture 6" descr="Graphical user interface, chart, bar chart&#10;&#10;Description automatically generated">
             <a:extLst>
               <a:ext uri="{FF2B5EF4-FFF2-40B4-BE49-F238E27FC236}">
-                <a16:creationId xmlns:a16="http://schemas.microsoft.com/office/drawing/2014/main" id="{8213143A-2111-C350-980F-35FFDD44BC7C}"/>
+                <a16:creationId xmlns:a16="http://schemas.microsoft.com/office/drawing/2014/main" id="{4BA1EDF3-565E-7EC5-B6A8-D8A87141F01D}"/>
               </a:ext>
             </a:extLst>
           </p:cNvPr>
@@ -8649,22 +9207,56 @@
           </p:cNvPicPr>
           <p:nvPr/>
         </p:nvPicPr>
-        <p:blipFill>
-          <a:blip r:embed="rId4">
+        <p:blipFill rotWithShape="1">
+          <a:blip r:embed="rId3">
             <a:extLst>
               <a:ext uri="{28A0092B-C50C-407E-A947-70E740481C1C}">
                 <a14:useLocalDpi xmlns:a14="http://schemas.microsoft.com/office/drawing/2010/main" val="0"/>
               </a:ext>
             </a:extLst>
           </a:blip>
-          <a:stretch>
-            <a:fillRect/>
-          </a:stretch>
+          <a:srcRect t="640" r="-513" b="66453"/>
+          <a:stretch/>
         </p:blipFill>
         <p:spPr>
           <a:xfrm>
-            <a:off x="129886" y="3253690"/>
-            <a:ext cx="4442114" cy="1825900"/>
+            <a:off x="296260" y="1760064"/>
+            <a:ext cx="4628071" cy="1508735"/>
+          </a:xfrm>
+          <a:prstGeom prst="rect">
+            <a:avLst/>
+          </a:prstGeom>
+        </p:spPr>
+      </p:pic>
+      <p:pic>
+        <p:nvPicPr>
+          <p:cNvPr id="12" name="Picture 11" descr="Graphical user interface, chart, bar chart&#10;&#10;Description automatically generated">
+            <a:extLst>
+              <a:ext uri="{FF2B5EF4-FFF2-40B4-BE49-F238E27FC236}">
+                <a16:creationId xmlns:a16="http://schemas.microsoft.com/office/drawing/2014/main" id="{AB50BAA7-69B0-BADC-60E3-55E75667FB2C}"/>
+              </a:ext>
+            </a:extLst>
+          </p:cNvPr>
+          <p:cNvPicPr>
+            <a:picLocks noChangeAspect="1"/>
+          </p:cNvPicPr>
+          <p:nvPr/>
+        </p:nvPicPr>
+        <p:blipFill rotWithShape="1">
+          <a:blip r:embed="rId3">
+            <a:extLst>
+              <a:ext uri="{28A0092B-C50C-407E-A947-70E740481C1C}">
+                <a14:useLocalDpi xmlns:a14="http://schemas.microsoft.com/office/drawing/2010/main" val="0"/>
+              </a:ext>
+            </a:extLst>
+          </a:blip>
+          <a:srcRect l="159" t="68368" r="35218"/>
+          <a:stretch/>
+        </p:blipFill>
+        <p:spPr>
+          <a:xfrm>
+            <a:off x="4876206" y="3257759"/>
+            <a:ext cx="3095302" cy="1508735"/>
           </a:xfrm>
           <a:prstGeom prst="rect">
             <a:avLst/>
@@ -8674,7 +9266,7 @@
     </p:spTree>
     <p:extLst>
       <p:ext uri="{BB962C8B-B14F-4D97-AF65-F5344CB8AC3E}">
-        <p14:creationId xmlns:p14="http://schemas.microsoft.com/office/powerpoint/2010/main" val="3474824870"/>
+        <p14:creationId xmlns:p14="http://schemas.microsoft.com/office/powerpoint/2010/main" val="3583579677"/>
       </p:ext>
     </p:extLst>
   </p:cSld>
@@ -8703,6 +9295,250 @@
       </p:grpSpPr>
       <p:sp>
         <p:nvSpPr>
+          <p:cNvPr id="5" name="Rectangle 4">
+            <a:extLst>
+              <a:ext uri="{FF2B5EF4-FFF2-40B4-BE49-F238E27FC236}">
+                <a16:creationId xmlns:a16="http://schemas.microsoft.com/office/drawing/2014/main" id="{46271187-3996-B1BC-FF20-371238B19BA6}"/>
+              </a:ext>
+            </a:extLst>
+          </p:cNvPr>
+          <p:cNvSpPr/>
+          <p:nvPr/>
+        </p:nvSpPr>
+        <p:spPr>
+          <a:xfrm>
+            <a:off x="46144" y="1390568"/>
+            <a:ext cx="9162300" cy="3760440"/>
+          </a:xfrm>
+          <a:prstGeom prst="rect">
+            <a:avLst/>
+          </a:prstGeom>
+          <a:solidFill>
+            <a:srgbClr val="2D081E"/>
+          </a:solidFill>
+          <a:ln w="38100">
+            <a:solidFill>
+              <a:srgbClr val="E434CB"/>
+            </a:solidFill>
+          </a:ln>
+        </p:spPr>
+        <p:style>
+          <a:lnRef idx="2">
+            <a:schemeClr val="accent1">
+              <a:shade val="50000"/>
+            </a:schemeClr>
+          </a:lnRef>
+          <a:fillRef idx="1">
+            <a:schemeClr val="accent1"/>
+          </a:fillRef>
+          <a:effectRef idx="0">
+            <a:schemeClr val="accent1"/>
+          </a:effectRef>
+          <a:fontRef idx="minor">
+            <a:schemeClr val="lt1"/>
+          </a:fontRef>
+        </p:style>
+        <p:txBody>
+          <a:bodyPr rtlCol="0" anchor="ctr"/>
+          <a:lstStyle/>
+          <a:p>
+            <a:pPr algn="ctr"/>
+            <a:endParaRPr lang="en-GR"/>
+          </a:p>
+        </p:txBody>
+      </p:sp>
+      <p:sp>
+        <p:nvSpPr>
+          <p:cNvPr id="2" name="Slide Number Placeholder 1">
+            <a:extLst>
+              <a:ext uri="{FF2B5EF4-FFF2-40B4-BE49-F238E27FC236}">
+                <a16:creationId xmlns:a16="http://schemas.microsoft.com/office/drawing/2014/main" id="{5B4FF148-3A8C-68FF-70ED-E12667E1B14A}"/>
+              </a:ext>
+            </a:extLst>
+          </p:cNvPr>
+          <p:cNvSpPr>
+            <a:spLocks noGrp="1"/>
+          </p:cNvSpPr>
+          <p:nvPr>
+            <p:ph type="sldNum" sz="quarter" idx="12"/>
+          </p:nvPr>
+        </p:nvSpPr>
+        <p:spPr/>
+        <p:txBody>
+          <a:bodyPr/>
+          <a:lstStyle/>
+          <a:p>
+            <a:fld id="{B82CCC60-E8CD-4174-8B1A-7DF615B22EEF}" type="slidenum">
+              <a:rPr lang="en-US" smtClean="0"/>
+              <a:pPr/>
+              <a:t>23</a:t>
+            </a:fld>
+            <a:endParaRPr lang="en-US"/>
+          </a:p>
+        </p:txBody>
+      </p:sp>
+      <p:sp>
+        <p:nvSpPr>
+          <p:cNvPr id="8" name="Title 3">
+            <a:extLst>
+              <a:ext uri="{FF2B5EF4-FFF2-40B4-BE49-F238E27FC236}">
+                <a16:creationId xmlns:a16="http://schemas.microsoft.com/office/drawing/2014/main" id="{57F3F99E-E37A-82F9-5CD0-39F7548D7501}"/>
+              </a:ext>
+            </a:extLst>
+          </p:cNvPr>
+          <p:cNvSpPr txBox="1">
+            <a:spLocks/>
+          </p:cNvSpPr>
+          <p:nvPr/>
+        </p:nvSpPr>
+        <p:spPr>
+          <a:xfrm>
+            <a:off x="3655770" y="1"/>
+            <a:ext cx="5488230" cy="1383059"/>
+          </a:xfrm>
+          <a:prstGeom prst="rect">
+            <a:avLst/>
+          </a:prstGeom>
+        </p:spPr>
+        <p:txBody>
+          <a:bodyPr anchor="ctr"/>
+          <a:lstStyle>
+            <a:lvl1pPr algn="ctr" defTabSz="914400" rtl="0" eaLnBrk="1" latinLnBrk="0" hangingPunct="1">
+              <a:spcBef>
+                <a:spcPct val="0"/>
+              </a:spcBef>
+              <a:buNone/>
+              <a:defRPr sz="4400" kern="1200">
+                <a:solidFill>
+                  <a:schemeClr val="tx1"/>
+                </a:solidFill>
+                <a:latin typeface="+mj-lt"/>
+                <a:ea typeface="+mj-ea"/>
+                <a:cs typeface="+mj-cs"/>
+              </a:defRPr>
+            </a:lvl1pPr>
+          </a:lstStyle>
+          <a:p>
+            <a:r>
+              <a:rPr lang="en-US" sz="2800" dirty="0">
+                <a:solidFill>
+                  <a:schemeClr val="bg1"/>
+                </a:solidFill>
+              </a:rPr>
+              <a:t>Model Training &amp; Evaluation</a:t>
+            </a:r>
+            <a:endParaRPr lang="en-US" sz="3600" dirty="0">
+              <a:solidFill>
+                <a:schemeClr val="bg1"/>
+              </a:solidFill>
+            </a:endParaRPr>
+          </a:p>
+        </p:txBody>
+      </p:sp>
+      <p:pic>
+        <p:nvPicPr>
+          <p:cNvPr id="13" name="Picture 12" descr="Graphical user interface, text, application&#10;&#10;Description automatically generated">
+            <a:extLst>
+              <a:ext uri="{FF2B5EF4-FFF2-40B4-BE49-F238E27FC236}">
+                <a16:creationId xmlns:a16="http://schemas.microsoft.com/office/drawing/2014/main" id="{C29B6A94-3EDC-D7EB-0DB6-B7630205339B}"/>
+              </a:ext>
+            </a:extLst>
+          </p:cNvPr>
+          <p:cNvPicPr>
+            <a:picLocks noChangeAspect="1"/>
+          </p:cNvPicPr>
+          <p:nvPr/>
+        </p:nvPicPr>
+        <p:blipFill>
+          <a:blip r:embed="rId3">
+            <a:extLst>
+              <a:ext uri="{28A0092B-C50C-407E-A947-70E740481C1C}">
+                <a14:useLocalDpi xmlns:a14="http://schemas.microsoft.com/office/drawing/2010/main" val="0"/>
+              </a:ext>
+            </a:extLst>
+          </a:blip>
+          <a:stretch>
+            <a:fillRect/>
+          </a:stretch>
+        </p:blipFill>
+        <p:spPr>
+          <a:xfrm>
+            <a:off x="4567818" y="1461389"/>
+            <a:ext cx="4442114" cy="1825900"/>
+          </a:xfrm>
+          <a:prstGeom prst="rect">
+            <a:avLst/>
+          </a:prstGeom>
+        </p:spPr>
+      </p:pic>
+      <p:pic>
+        <p:nvPicPr>
+          <p:cNvPr id="15" name="Picture 14" descr="Graphical user interface, text, application&#10;&#10;Description automatically generated">
+            <a:extLst>
+              <a:ext uri="{FF2B5EF4-FFF2-40B4-BE49-F238E27FC236}">
+                <a16:creationId xmlns:a16="http://schemas.microsoft.com/office/drawing/2014/main" id="{8213143A-2111-C350-980F-35FFDD44BC7C}"/>
+              </a:ext>
+            </a:extLst>
+          </p:cNvPr>
+          <p:cNvPicPr>
+            <a:picLocks noChangeAspect="1"/>
+          </p:cNvPicPr>
+          <p:nvPr/>
+        </p:nvPicPr>
+        <p:blipFill>
+          <a:blip r:embed="rId4">
+            <a:extLst>
+              <a:ext uri="{28A0092B-C50C-407E-A947-70E740481C1C}">
+                <a14:useLocalDpi xmlns:a14="http://schemas.microsoft.com/office/drawing/2010/main" val="0"/>
+              </a:ext>
+            </a:extLst>
+          </a:blip>
+          <a:stretch>
+            <a:fillRect/>
+          </a:stretch>
+        </p:blipFill>
+        <p:spPr>
+          <a:xfrm>
+            <a:off x="129886" y="3253690"/>
+            <a:ext cx="4442114" cy="1825900"/>
+          </a:xfrm>
+          <a:prstGeom prst="rect">
+            <a:avLst/>
+          </a:prstGeom>
+        </p:spPr>
+      </p:pic>
+    </p:spTree>
+    <p:extLst>
+      <p:ext uri="{BB962C8B-B14F-4D97-AF65-F5344CB8AC3E}">
+        <p14:creationId xmlns:p14="http://schemas.microsoft.com/office/powerpoint/2010/main" val="3474824870"/>
+      </p:ext>
+    </p:extLst>
+  </p:cSld>
+  <p:clrMapOvr>
+    <a:masterClrMapping/>
+  </p:clrMapOvr>
+</p:sld>
+</file>
+
+<file path=ppt/slides/slide24.xml><?xml version="1.0" encoding="utf-8"?>
+<p:sld xmlns:a="http://schemas.openxmlformats.org/drawingml/2006/main" xmlns:r="http://schemas.openxmlformats.org/officeDocument/2006/relationships" xmlns:p="http://schemas.openxmlformats.org/presentationml/2006/main">
+  <p:cSld>
+    <p:spTree>
+      <p:nvGrpSpPr>
+        <p:cNvPr id="1" name=""/>
+        <p:cNvGrpSpPr/>
+        <p:nvPr/>
+      </p:nvGrpSpPr>
+      <p:grpSpPr>
+        <a:xfrm>
+          <a:off x="0" y="0"/>
+          <a:ext cx="0" cy="0"/>
+          <a:chOff x="0" y="0"/>
+          <a:chExt cx="0" cy="0"/>
+        </a:xfrm>
+      </p:grpSpPr>
+      <p:sp>
+        <p:nvSpPr>
           <p:cNvPr id="4" name="Title 3"/>
           <p:cNvSpPr>
             <a:spLocks noGrp="1"/>
@@ -8766,7 +9602,7 @@
             <a:fld id="{B82CCC60-E8CD-4174-8B1A-7DF615B22EEF}" type="slidenum">
               <a:rPr lang="en-US" smtClean="0"/>
               <a:pPr/>
-              <a:t>23</a:t>
+              <a:t>24</a:t>
             </a:fld>
             <a:endParaRPr lang="en-US"/>
           </a:p>
@@ -10247,10 +11083,10 @@
       </p:sp>
       <p:pic>
         <p:nvPicPr>
-          <p:cNvPr id="3" name="Picture 2" descr="Icon&#10;&#10;Description automatically generated">
+          <p:cNvPr id="4" name="Picture 3" descr="Icon&#10;&#10;Description automatically generated">
             <a:extLst>
               <a:ext uri="{FF2B5EF4-FFF2-40B4-BE49-F238E27FC236}">
-                <a16:creationId xmlns:a16="http://schemas.microsoft.com/office/drawing/2014/main" id="{D17D3E82-D08E-E879-0E6F-67FB0F3697BA}"/>
+                <a16:creationId xmlns:a16="http://schemas.microsoft.com/office/drawing/2014/main" id="{15365642-722C-B544-EB80-A393CB309862}"/>
               </a:ext>
             </a:extLst>
           </p:cNvPr>
@@ -10273,8 +11109,8 @@
         </p:blipFill>
         <p:spPr>
           <a:xfrm>
-            <a:off x="7185622" y="4067426"/>
-            <a:ext cx="627241" cy="627241"/>
+            <a:off x="7198824" y="4081402"/>
+            <a:ext cx="614038" cy="614038"/>
           </a:xfrm>
           <a:prstGeom prst="rect">
             <a:avLst/>

</xml_diff>